<commit_message>
Started Issue 372 [Update team member photo [Damith]]
</commit_message>
<xml_diff>
--- a/src/main/webapp/images/teammembers/background.pptx
+++ b/src/main/webapp/images/teammembers/background.pptx
@@ -6,6 +6,7 @@
   </p:sldMasterIdLst>
   <p:sldIdLst>
     <p:sldId id="256" r:id="rId2"/>
+    <p:sldId id="257" r:id="rId3"/>
   </p:sldIdLst>
   <p:sldSz cx="9144000" cy="6858000" type="screen4x3"/>
   <p:notesSz cx="6858000" cy="9144000"/>
@@ -288,7 +289,7 @@
           <a:p>
             <a:fld id="{9EDCAED8-956B-1E47-BC3B-A7C5FFBA6198}" type="datetimeFigureOut">
               <a:rPr lang="en-US" smtClean="0"/>
-              <a:t>20/8/12</a:t>
+              <a:t>10/30/2012</a:t>
             </a:fld>
             <a:endParaRPr lang="en-US"/>
           </a:p>
@@ -458,7 +459,7 @@
           <a:p>
             <a:fld id="{9EDCAED8-956B-1E47-BC3B-A7C5FFBA6198}" type="datetimeFigureOut">
               <a:rPr lang="en-US" smtClean="0"/>
-              <a:t>20/8/12</a:t>
+              <a:t>10/30/2012</a:t>
             </a:fld>
             <a:endParaRPr lang="en-US"/>
           </a:p>
@@ -638,7 +639,7 @@
           <a:p>
             <a:fld id="{9EDCAED8-956B-1E47-BC3B-A7C5FFBA6198}" type="datetimeFigureOut">
               <a:rPr lang="en-US" smtClean="0"/>
-              <a:t>20/8/12</a:t>
+              <a:t>10/30/2012</a:t>
             </a:fld>
             <a:endParaRPr lang="en-US"/>
           </a:p>
@@ -808,7 +809,7 @@
           <a:p>
             <a:fld id="{9EDCAED8-956B-1E47-BC3B-A7C5FFBA6198}" type="datetimeFigureOut">
               <a:rPr lang="en-US" smtClean="0"/>
-              <a:t>20/8/12</a:t>
+              <a:t>10/30/2012</a:t>
             </a:fld>
             <a:endParaRPr lang="en-US"/>
           </a:p>
@@ -1054,7 +1055,7 @@
           <a:p>
             <a:fld id="{9EDCAED8-956B-1E47-BC3B-A7C5FFBA6198}" type="datetimeFigureOut">
               <a:rPr lang="en-US" smtClean="0"/>
-              <a:t>20/8/12</a:t>
+              <a:t>10/30/2012</a:t>
             </a:fld>
             <a:endParaRPr lang="en-US"/>
           </a:p>
@@ -1342,7 +1343,7 @@
           <a:p>
             <a:fld id="{9EDCAED8-956B-1E47-BC3B-A7C5FFBA6198}" type="datetimeFigureOut">
               <a:rPr lang="en-US" smtClean="0"/>
-              <a:t>20/8/12</a:t>
+              <a:t>10/30/2012</a:t>
             </a:fld>
             <a:endParaRPr lang="en-US"/>
           </a:p>
@@ -1764,7 +1765,7 @@
           <a:p>
             <a:fld id="{9EDCAED8-956B-1E47-BC3B-A7C5FFBA6198}" type="datetimeFigureOut">
               <a:rPr lang="en-US" smtClean="0"/>
-              <a:t>20/8/12</a:t>
+              <a:t>10/30/2012</a:t>
             </a:fld>
             <a:endParaRPr lang="en-US"/>
           </a:p>
@@ -1882,7 +1883,7 @@
           <a:p>
             <a:fld id="{9EDCAED8-956B-1E47-BC3B-A7C5FFBA6198}" type="datetimeFigureOut">
               <a:rPr lang="en-US" smtClean="0"/>
-              <a:t>20/8/12</a:t>
+              <a:t>10/30/2012</a:t>
             </a:fld>
             <a:endParaRPr lang="en-US"/>
           </a:p>
@@ -1977,7 +1978,7 @@
           <a:p>
             <a:fld id="{9EDCAED8-956B-1E47-BC3B-A7C5FFBA6198}" type="datetimeFigureOut">
               <a:rPr lang="en-US" smtClean="0"/>
-              <a:t>20/8/12</a:t>
+              <a:t>10/30/2012</a:t>
             </a:fld>
             <a:endParaRPr lang="en-US"/>
           </a:p>
@@ -2254,7 +2255,7 @@
           <a:p>
             <a:fld id="{9EDCAED8-956B-1E47-BC3B-A7C5FFBA6198}" type="datetimeFigureOut">
               <a:rPr lang="en-US" smtClean="0"/>
-              <a:t>20/8/12</a:t>
+              <a:t>10/30/2012</a:t>
             </a:fld>
             <a:endParaRPr lang="en-US"/>
           </a:p>
@@ -2507,7 +2508,7 @@
           <a:p>
             <a:fld id="{9EDCAED8-956B-1E47-BC3B-A7C5FFBA6198}" type="datetimeFigureOut">
               <a:rPr lang="en-US" smtClean="0"/>
-              <a:t>20/8/12</a:t>
+              <a:t>10/30/2012</a:t>
             </a:fld>
             <a:endParaRPr lang="en-US"/>
           </a:p>
@@ -2720,7 +2721,7 @@
           <a:p>
             <a:fld id="{9EDCAED8-956B-1E47-BC3B-A7C5FFBA6198}" type="datetimeFigureOut">
               <a:rPr lang="en-US" smtClean="0"/>
-              <a:t>20/8/12</a:t>
+              <a:t>10/30/2012</a:t>
             </a:fld>
             <a:endParaRPr lang="en-US"/>
           </a:p>
@@ -3126,6 +3127,158 @@
   <p:clrMapOvr>
     <a:masterClrMapping/>
   </p:clrMapOvr>
+  <p:timing>
+    <p:tnLst>
+      <p:par>
+        <p:cTn id="1" dur="indefinite" restart="never" nodeType="tmRoot"/>
+      </p:par>
+    </p:tnLst>
+  </p:timing>
+</p:sld>
+</file>
+
+<file path=ppt/slides/slide2.xml><?xml version="1.0" encoding="utf-8"?>
+<p:sld xmlns:a="http://schemas.openxmlformats.org/drawingml/2006/main" xmlns:r="http://schemas.openxmlformats.org/officeDocument/2006/relationships" xmlns:p="http://schemas.openxmlformats.org/presentationml/2006/main">
+  <p:cSld>
+    <p:bg>
+      <p:bgPr>
+        <a:gradFill flip="none" rotWithShape="1">
+          <a:gsLst>
+            <a:gs pos="100000">
+              <a:schemeClr val="bg1">
+                <a:lumMod val="65000"/>
+              </a:schemeClr>
+            </a:gs>
+            <a:gs pos="60000">
+              <a:schemeClr val="bg1">
+                <a:lumMod val="95000"/>
+              </a:schemeClr>
+            </a:gs>
+          </a:gsLst>
+          <a:lin ang="16200000" scaled="0"/>
+          <a:tileRect/>
+        </a:gradFill>
+        <a:effectLst/>
+      </p:bgPr>
+    </p:bg>
+    <p:spTree>
+      <p:nvGrpSpPr>
+        <p:cNvPr id="1" name=""/>
+        <p:cNvGrpSpPr/>
+        <p:nvPr/>
+      </p:nvGrpSpPr>
+      <p:grpSpPr>
+        <a:xfrm>
+          <a:off x="0" y="0"/>
+          <a:ext cx="0" cy="0"/>
+          <a:chOff x="0" y="0"/>
+          <a:chExt cx="0" cy="0"/>
+        </a:xfrm>
+      </p:grpSpPr>
+      <p:pic>
+        <p:nvPicPr>
+          <p:cNvPr id="1028" name="Picture 4" descr="D:\myPics\2011\mexico\IMG_2346.JPG"/>
+          <p:cNvPicPr>
+            <a:picLocks noChangeAspect="1" noChangeArrowheads="1"/>
+          </p:cNvPicPr>
+          <p:nvPr/>
+        </p:nvPicPr>
+        <p:blipFill rotWithShape="1">
+          <a:blip r:embed="rId2">
+            <a:extLst>
+              <a:ext uri="{BEBA8EAE-BF5A-486C-A8C5-ECC9F3942E4B}">
+                <a14:imgProps xmlns:a14="http://schemas.microsoft.com/office/drawing/2010/main">
+                  <a14:imgLayer r:embed="rId3">
+                    <a14:imgEffect>
+                      <a14:backgroundRemoval t="32520" b="64014" l="29753" r="89193">
+                        <a14:foregroundMark x1="45182" y1="56836" x2="45182" y2="56836"/>
+                        <a14:foregroundMark x1="49023" y1="56836" x2="49023" y2="56836"/>
+                        <a14:foregroundMark x1="50000" y1="60840" x2="50000" y2="60840"/>
+                        <a14:foregroundMark x1="51628" y1="58838" x2="51628" y2="58838"/>
+                        <a14:foregroundMark x1="52409" y1="61914" x2="52409" y2="61914"/>
+                        <a14:foregroundMark x1="38672" y1="55469" x2="38672" y2="55469"/>
+                        <a14:foregroundMark x1="39388" y1="53613" x2="39388" y2="53613"/>
+                        <a14:foregroundMark x1="36719" y1="55176" x2="36719" y2="55176"/>
+                        <a14:foregroundMark x1="36719" y1="56494" x2="36719" y2="56494"/>
+                        <a14:foregroundMark x1="37891" y1="58154" x2="37891" y2="58154"/>
+                        <a14:foregroundMark x1="35221" y1="58154" x2="35221" y2="58154"/>
+                        <a14:foregroundMark x1="63346" y1="57031" x2="63346" y2="57031"/>
+                        <a14:foregroundMark x1="77214" y1="61621" x2="77214" y2="61621"/>
+                        <a14:foregroundMark x1="73568" y1="59033" x2="73568" y2="59033"/>
+                        <a14:foregroundMark x1="73828" y1="63135" x2="73828" y2="63135"/>
+                        <a14:foregroundMark x1="75195" y1="63232" x2="75195" y2="63232"/>
+                        <a14:foregroundMark x1="78255" y1="63672" x2="78255" y2="63672"/>
+                        <a14:foregroundMark x1="63607" y1="63037" x2="63607" y2="63037"/>
+                        <a14:foregroundMark x1="64193" y1="61279" x2="64193" y2="61279"/>
+                        <a14:foregroundMark x1="61263" y1="62695" x2="61263" y2="62695"/>
+                        <a14:foregroundMark x1="59049" y1="63232" x2="59049" y2="63232"/>
+                        <a14:foregroundMark x1="35677" y1="61621" x2="35677" y2="61621"/>
+                        <a14:foregroundMark x1="35221" y1="62500" x2="35221" y2="62500"/>
+                        <a14:foregroundMark x1="33333" y1="62695" x2="33333" y2="62695"/>
+                        <a14:foregroundMark x1="32552" y1="62012" x2="32552" y2="62012"/>
+                        <a14:foregroundMark x1="31250" y1="61719" x2="31250" y2="61719"/>
+                        <a14:foregroundMark x1="31380" y1="62793" x2="31380" y2="62793"/>
+                        <a14:foregroundMark x1="33919" y1="63477" x2="33919" y2="63477"/>
+                        <a14:foregroundMark x1="32552" y1="63672" x2="32552" y2="63672"/>
+                        <a14:foregroundMark x1="31706" y1="63672" x2="31706" y2="63672"/>
+                        <a14:foregroundMark x1="33203" y1="61230" x2="33203" y2="61230"/>
+                        <a14:foregroundMark x1="77083" y1="63574" x2="77083" y2="63574"/>
+                        <a14:foregroundMark x1="79036" y1="63379" x2="79036" y2="63379"/>
+                        <a14:foregroundMark x1="74870" y1="59180" x2="74870" y2="59180"/>
+                        <a14:foregroundMark x1="30208" y1="54248" x2="30208" y2="54248"/>
+                        <a14:foregroundMark x1="30534" y1="63672" x2="30534" y2="63672"/>
+                        <a14:foregroundMark x1="79036" y1="62939" x2="79036" y2="62939"/>
+                        <a14:foregroundMark x1="30208" y1="53613" x2="30208" y2="53613"/>
+                      </a14:backgroundRemoval>
+                    </a14:imgEffect>
+                  </a14:imgLayer>
+                </a14:imgProps>
+              </a:ext>
+              <a:ext uri="{28A0092B-C50C-407E-A947-70E740481C1C}">
+                <a14:useLocalDpi xmlns:a14="http://schemas.microsoft.com/office/drawing/2010/main" val="0"/>
+              </a:ext>
+            </a:extLst>
+          </a:blip>
+          <a:srcRect l="29951" t="30643" r="10813" b="36023"/>
+          <a:stretch/>
+        </p:blipFill>
+        <p:spPr bwMode="auto">
+          <a:xfrm>
+            <a:off x="15932" y="96930"/>
+            <a:ext cx="9128067" cy="6848669"/>
+          </a:xfrm>
+          <a:prstGeom prst="rect">
+            <a:avLst/>
+          </a:prstGeom>
+          <a:noFill/>
+          <a:extLst>
+            <a:ext uri="{909E8E84-426E-40DD-AFC4-6F175D3DCCD1}">
+              <a14:hiddenFill xmlns:a14="http://schemas.microsoft.com/office/drawing/2010/main">
+                <a:solidFill>
+                  <a:srgbClr val="FFFFFF"/>
+                </a:solidFill>
+              </a14:hiddenFill>
+            </a:ext>
+          </a:extLst>
+        </p:spPr>
+      </p:pic>
+    </p:spTree>
+    <p:extLst>
+      <p:ext uri="{BB962C8B-B14F-4D97-AF65-F5344CB8AC3E}">
+        <p14:creationId xmlns:p14="http://schemas.microsoft.com/office/powerpoint/2010/main" val="1017202874"/>
+      </p:ext>
+    </p:extLst>
+  </p:cSld>
+  <p:clrMapOvr>
+    <a:masterClrMapping/>
+  </p:clrMapOvr>
+  <p:timing>
+    <p:tnLst>
+      <p:par>
+        <p:cTn id="1" dur="indefinite" restart="never" nodeType="tmRoot"/>
+      </p:par>
+    </p:tnLst>
+  </p:timing>
 </p:sld>
 </file>
 

</xml_diff>